<commit_message>
diagrams and front pages
</commit_message>
<xml_diff>
--- a/project.pptx
+++ b/project.pptx
@@ -271,6 +271,11 @@
       </a:defRPr>
     </a:lvl9pPr>
   </p:defaultTextStyle>
+  <p:extLst>
+    <p:ext uri="{EFAFB233-063F-42B5-8137-9DF3F51BA10A}">
+      <p15:sldGuideLst xmlns:p15="http://schemas.microsoft.com/office/powerpoint/2012/main"/>
+    </p:ext>
+  </p:extLst>
 </p:presentation>
 </file>
 
@@ -807,7 +812,7 @@
               </a:spcAft>
               <a:buNone/>
             </a:pPr>
-            <a:endParaRPr/>
+            <a:endParaRPr dirty="0"/>
           </a:p>
         </p:txBody>
       </p:sp>
@@ -911,7 +916,7 @@
               </a:spcAft>
               <a:buNone/>
             </a:pPr>
-            <a:endParaRPr/>
+            <a:endParaRPr dirty="0"/>
           </a:p>
         </p:txBody>
       </p:sp>
@@ -1015,7 +1020,7 @@
               </a:spcAft>
               <a:buNone/>
             </a:pPr>
-            <a:endParaRPr/>
+            <a:endParaRPr dirty="0"/>
           </a:p>
         </p:txBody>
       </p:sp>
@@ -1124,7 +1129,7 @@
               </a:spcAft>
               <a:buNone/>
             </a:pPr>
-            <a:endParaRPr/>
+            <a:endParaRPr dirty="0"/>
           </a:p>
         </p:txBody>
       </p:sp>
@@ -1233,7 +1238,7 @@
               </a:spcAft>
               <a:buNone/>
             </a:pPr>
-            <a:endParaRPr/>
+            <a:endParaRPr dirty="0"/>
           </a:p>
         </p:txBody>
       </p:sp>
@@ -1342,7 +1347,7 @@
               </a:spcAft>
               <a:buNone/>
             </a:pPr>
-            <a:endParaRPr/>
+            <a:endParaRPr dirty="0"/>
           </a:p>
         </p:txBody>
       </p:sp>
@@ -1446,7 +1451,7 @@
               </a:spcAft>
               <a:buNone/>
             </a:pPr>
-            <a:endParaRPr/>
+            <a:endParaRPr dirty="0"/>
           </a:p>
         </p:txBody>
       </p:sp>
@@ -1550,7 +1555,7 @@
               </a:spcAft>
               <a:buNone/>
             </a:pPr>
-            <a:endParaRPr/>
+            <a:endParaRPr dirty="0"/>
           </a:p>
         </p:txBody>
       </p:sp>
@@ -1659,7 +1664,7 @@
               </a:spcAft>
               <a:buNone/>
             </a:pPr>
-            <a:endParaRPr/>
+            <a:endParaRPr dirty="0"/>
           </a:p>
         </p:txBody>
       </p:sp>
@@ -1887,7 +1892,7 @@
               </a:spcAft>
               <a:buNone/>
             </a:pPr>
-            <a:endParaRPr/>
+            <a:endParaRPr dirty="0"/>
           </a:p>
         </p:txBody>
       </p:sp>
@@ -2249,7 +2254,7 @@
               <a:rPr lang="en"/>
               <a:t>‹#›</a:t>
             </a:fld>
-            <a:endParaRPr/>
+            <a:endParaRPr dirty="0"/>
           </a:p>
         </p:txBody>
       </p:sp>
@@ -2321,7 +2326,7 @@
               </a:spcAft>
               <a:buNone/>
             </a:pPr>
-            <a:endParaRPr/>
+            <a:endParaRPr dirty="0"/>
           </a:p>
         </p:txBody>
       </p:sp>
@@ -2418,7 +2423,7 @@
               </a:spcAft>
               <a:buNone/>
             </a:pPr>
-            <a:endParaRPr/>
+            <a:endParaRPr dirty="0"/>
           </a:p>
         </p:txBody>
       </p:sp>
@@ -2651,7 +2656,7 @@
               </a:rPr>
               <a:t>“</a:t>
             </a:r>
-            <a:endParaRPr sz="4800" b="1">
+            <a:endParaRPr sz="4800" b="1" dirty="0">
               <a:solidFill>
                 <a:schemeClr val="accent1"/>
               </a:solidFill>
@@ -2774,7 +2779,7 @@
               <a:rPr lang="en"/>
               <a:t>‹#›</a:t>
             </a:fld>
-            <a:endParaRPr/>
+            <a:endParaRPr dirty="0"/>
           </a:p>
         </p:txBody>
       </p:sp>
@@ -3265,7 +3270,7 @@
               <a:rPr lang="en"/>
               <a:t>‹#›</a:t>
             </a:fld>
-            <a:endParaRPr/>
+            <a:endParaRPr dirty="0"/>
           </a:p>
         </p:txBody>
       </p:sp>
@@ -3337,7 +3342,7 @@
               </a:spcAft>
               <a:buNone/>
             </a:pPr>
-            <a:endParaRPr/>
+            <a:endParaRPr dirty="0"/>
           </a:p>
         </p:txBody>
       </p:sp>
@@ -3383,7 +3388,7 @@
               </a:spcAft>
               <a:buNone/>
             </a:pPr>
-            <a:endParaRPr/>
+            <a:endParaRPr dirty="0"/>
           </a:p>
         </p:txBody>
       </p:sp>
@@ -3487,7 +3492,7 @@
               <a:rPr lang="en"/>
               <a:t>‹#›</a:t>
             </a:fld>
-            <a:endParaRPr/>
+            <a:endParaRPr dirty="0"/>
           </a:p>
         </p:txBody>
       </p:sp>
@@ -3559,7 +3564,7 @@
               </a:spcAft>
               <a:buNone/>
             </a:pPr>
-            <a:endParaRPr/>
+            <a:endParaRPr dirty="0"/>
           </a:p>
         </p:txBody>
       </p:sp>
@@ -4229,7 +4234,7 @@
               <a:rPr lang="en"/>
               <a:t>‹#›</a:t>
             </a:fld>
-            <a:endParaRPr/>
+            <a:endParaRPr dirty="0"/>
           </a:p>
         </p:txBody>
       </p:sp>
@@ -4991,10 +4996,10 @@
               <a:buNone/>
             </a:pPr>
             <a:r>
-              <a:rPr lang="en" dirty="0"/>
-              <a:t>Prevention of security breaches caused by SQL Injections</a:t>
+              <a:rPr lang="en" sz="6600" dirty="0"/>
+              <a:t>Prayosha</a:t>
             </a:r>
-            <a:endParaRPr dirty="0"/>
+            <a:endParaRPr sz="6600" dirty="0"/>
           </a:p>
         </p:txBody>
       </p:sp>
@@ -5088,13 +5093,13 @@
   <p:clrMapOvr>
     <a:masterClrMapping/>
   </p:clrMapOvr>
-  <mc:AlternateContent xmlns:mc="http://schemas.openxmlformats.org/markup-compatibility/2006">
-    <mc:Choice xmlns:p159="http://schemas.microsoft.com/office/powerpoint/2015/09/main" Requires="p159">
+  <mc:AlternateContent xmlns:mc="http://schemas.openxmlformats.org/markup-compatibility/2006" xmlns:p159="http://schemas.microsoft.com/office/powerpoint/2015/09/main">
+    <mc:Choice Requires="p159">
       <p:transition xmlns:p14="http://schemas.microsoft.com/office/powerpoint/2010/main" spd="slow" p14:dur="2000">
         <p159:morph option="byObject"/>
       </p:transition>
     </mc:Choice>
-    <mc:Fallback>
+    <mc:Fallback xmlns="">
       <p:transition spd="slow">
         <p:fade/>
       </p:transition>
@@ -6561,7 +6566,7 @@
                 <a:cs typeface="Quicksand"/>
                 <a:sym typeface="Quicksand"/>
               </a:rPr>
-              <a:t>Prevention of Security breaches caused by SQL Injections</a:t>
+              <a:t>Prayosha</a:t>
             </a:r>
             <a:endParaRPr sz="1600" dirty="0">
               <a:solidFill>
@@ -6692,31 +6697,7 @@
                 <a:effectLst/>
                 <a:latin typeface="Söhne"/>
               </a:rPr>
-              <a:t>Web app for </a:t>
-            </a:r>
-            <a:r>
-              <a:rPr lang="en-GB" sz="2000" b="0" i="0" dirty="0" err="1">
-                <a:solidFill>
-                  <a:schemeClr val="bg1">
-                    <a:lumMod val="85000"/>
-                  </a:schemeClr>
-                </a:solidFill>
-                <a:effectLst/>
-                <a:latin typeface="Söhne"/>
-              </a:rPr>
-              <a:t>Prayosha</a:t>
-            </a:r>
-            <a:r>
-              <a:rPr lang="en-GB" sz="2000" b="0" i="0" dirty="0">
-                <a:solidFill>
-                  <a:schemeClr val="bg1">
-                    <a:lumMod val="85000"/>
-                  </a:schemeClr>
-                </a:solidFill>
-                <a:effectLst/>
-                <a:latin typeface="Söhne"/>
-              </a:rPr>
-              <a:t>, a solar panel company, prevents SQL Injection attacks with parameterized queries, input validations, limited privileges, updates, firewalls, and user education. Ensures secure, reliable, error-free operations.</a:t>
+              <a:t>Web app for Prayosha, a solar panel company, prevents SQL Injection attacks with parameterized queries, input validations, limited privileges, updates, firewalls, and user education. Ensures secure, reliable, error-free operations.</a:t>
             </a:r>
           </a:p>
           <a:p>
@@ -6819,7 +6800,7 @@
               <a:rPr lang="en"/>
               <a:t>2</a:t>
             </a:fld>
-            <a:endParaRPr/>
+            <a:endParaRPr dirty="0"/>
           </a:p>
         </p:txBody>
       </p:sp>
@@ -6892,13 +6873,13 @@
   <p:clrMapOvr>
     <a:masterClrMapping/>
   </p:clrMapOvr>
-  <mc:AlternateContent xmlns:mc="http://schemas.openxmlformats.org/markup-compatibility/2006">
-    <mc:Choice xmlns:p159="http://schemas.microsoft.com/office/powerpoint/2015/09/main" Requires="p159">
+  <mc:AlternateContent xmlns:mc="http://schemas.openxmlformats.org/markup-compatibility/2006" xmlns:p159="http://schemas.microsoft.com/office/powerpoint/2015/09/main">
+    <mc:Choice Requires="p159">
       <p:transition xmlns:p14="http://schemas.microsoft.com/office/powerpoint/2010/main" spd="slow" p14:dur="2000">
         <p159:morph option="byObject"/>
       </p:transition>
     </mc:Choice>
-    <mc:Fallback>
+    <mc:Fallback xmlns="">
       <p:transition spd="slow">
         <p:fade/>
       </p:transition>
@@ -7885,7 +7866,7 @@
               <a:rPr lang="en"/>
               <a:t>3</a:t>
             </a:fld>
-            <a:endParaRPr/>
+            <a:endParaRPr dirty="0"/>
           </a:p>
         </p:txBody>
       </p:sp>
@@ -7963,13 +7944,13 @@
   <p:clrMapOvr>
     <a:masterClrMapping/>
   </p:clrMapOvr>
-  <mc:AlternateContent xmlns:mc="http://schemas.openxmlformats.org/markup-compatibility/2006">
-    <mc:Choice xmlns:p159="http://schemas.microsoft.com/office/powerpoint/2015/09/main" Requires="p159">
+  <mc:AlternateContent xmlns:mc="http://schemas.openxmlformats.org/markup-compatibility/2006" xmlns:p159="http://schemas.microsoft.com/office/powerpoint/2015/09/main">
+    <mc:Choice Requires="p159">
       <p:transition xmlns:p14="http://schemas.microsoft.com/office/powerpoint/2010/main" spd="slow" p14:dur="2000">
         <p159:morph option="byObject"/>
       </p:transition>
     </mc:Choice>
-    <mc:Fallback>
+    <mc:Fallback xmlns="">
       <p:transition spd="slow">
         <p:fade/>
       </p:transition>
@@ -8084,18 +8065,6 @@
               <a:t>HTML: </a:t>
             </a:r>
             <a:r>
-              <a:rPr lang="en-GB" sz="1600" b="1" i="0" dirty="0" err="1">
-                <a:solidFill>
-                  <a:schemeClr val="bg1">
-                    <a:lumMod val="85000"/>
-                  </a:schemeClr>
-                </a:solidFill>
-                <a:effectLst/>
-                <a:latin typeface="Quicksand" panose="020B0604020202020204" charset="0"/>
-              </a:rPr>
-              <a:t>HyperText</a:t>
-            </a:r>
-            <a:r>
               <a:rPr lang="en-GB" sz="1600" b="1" i="0" dirty="0">
                 <a:solidFill>
                   <a:schemeClr val="bg1">
@@ -8105,7 +8074,7 @@
                 <a:effectLst/>
                 <a:latin typeface="Quicksand" panose="020B0604020202020204" charset="0"/>
               </a:rPr>
-              <a:t> Markup Language (HTML) is a shorthand for this language. Markup language is used to develop websites online.</a:t>
+              <a:t>HyperText Markup Language (HTML) is a shorthand for this language. Markup language is used to develop websites online.</a:t>
             </a:r>
           </a:p>
           <a:p>
@@ -8256,7 +8225,7 @@
               <a:rPr lang="en"/>
               <a:t>4</a:t>
             </a:fld>
-            <a:endParaRPr/>
+            <a:endParaRPr dirty="0"/>
           </a:p>
         </p:txBody>
       </p:sp>
@@ -8334,13 +8303,13 @@
   <p:clrMapOvr>
     <a:masterClrMapping/>
   </p:clrMapOvr>
-  <mc:AlternateContent xmlns:mc="http://schemas.openxmlformats.org/markup-compatibility/2006">
-    <mc:Choice xmlns:p159="http://schemas.microsoft.com/office/powerpoint/2015/09/main" Requires="p159">
+  <mc:AlternateContent xmlns:mc="http://schemas.openxmlformats.org/markup-compatibility/2006" xmlns:p159="http://schemas.microsoft.com/office/powerpoint/2015/09/main">
+    <mc:Choice Requires="p159">
       <p:transition xmlns:p14="http://schemas.microsoft.com/office/powerpoint/2010/main" spd="slow" p14:dur="2000">
         <p159:morph option="byObject"/>
       </p:transition>
     </mc:Choice>
-    <mc:Fallback>
+    <mc:Fallback xmlns="">
       <p:transition spd="slow">
         <p:fade/>
       </p:transition>
@@ -8564,7 +8533,7 @@
               <a:rPr lang="en"/>
               <a:t>5</a:t>
             </a:fld>
-            <a:endParaRPr/>
+            <a:endParaRPr dirty="0"/>
           </a:p>
         </p:txBody>
       </p:sp>
@@ -8640,13 +8609,13 @@
   <p:clrMapOvr>
     <a:masterClrMapping/>
   </p:clrMapOvr>
-  <mc:AlternateContent xmlns:mc="http://schemas.openxmlformats.org/markup-compatibility/2006">
-    <mc:Choice xmlns:p159="http://schemas.microsoft.com/office/powerpoint/2015/09/main" Requires="p159">
+  <mc:AlternateContent xmlns:mc="http://schemas.openxmlformats.org/markup-compatibility/2006" xmlns:p159="http://schemas.microsoft.com/office/powerpoint/2015/09/main">
+    <mc:Choice Requires="p159">
       <p:transition xmlns:p14="http://schemas.microsoft.com/office/powerpoint/2010/main" spd="slow" p14:dur="2000">
         <p159:morph option="byObject"/>
       </p:transition>
     </mc:Choice>
-    <mc:Fallback>
+    <mc:Fallback xmlns="">
       <p:transition spd="slow">
         <p:fade/>
       </p:transition>
@@ -8714,7 +8683,7 @@
               </a:spcAft>
               <a:buNone/>
             </a:pPr>
-            <a:endParaRPr/>
+            <a:endParaRPr dirty="0"/>
           </a:p>
         </p:txBody>
       </p:sp>
@@ -8870,7 +8839,7 @@
               <a:rPr lang="en"/>
               <a:t>6</a:t>
             </a:fld>
-            <a:endParaRPr/>
+            <a:endParaRPr dirty="0"/>
           </a:p>
         </p:txBody>
       </p:sp>
@@ -8941,13 +8910,13 @@
   <p:clrMapOvr>
     <a:masterClrMapping/>
   </p:clrMapOvr>
-  <mc:AlternateContent xmlns:mc="http://schemas.openxmlformats.org/markup-compatibility/2006">
-    <mc:Choice xmlns:p159="http://schemas.microsoft.com/office/powerpoint/2015/09/main" Requires="p159">
+  <mc:AlternateContent xmlns:mc="http://schemas.openxmlformats.org/markup-compatibility/2006" xmlns:p159="http://schemas.microsoft.com/office/powerpoint/2015/09/main">
+    <mc:Choice Requires="p159">
       <p:transition xmlns:p14="http://schemas.microsoft.com/office/powerpoint/2010/main" spd="slow" p14:dur="2000">
         <p159:morph option="byObject"/>
       </p:transition>
     </mc:Choice>
-    <mc:Fallback>
+    <mc:Fallback xmlns="">
       <p:transition spd="slow">
         <p:fade/>
       </p:transition>
@@ -9210,7 +9179,7 @@
               <a:rPr lang="en"/>
               <a:t>7</a:t>
             </a:fld>
-            <a:endParaRPr/>
+            <a:endParaRPr dirty="0"/>
           </a:p>
         </p:txBody>
       </p:sp>
@@ -9251,13 +9220,13 @@
   <p:clrMapOvr>
     <a:masterClrMapping/>
   </p:clrMapOvr>
-  <mc:AlternateContent xmlns:mc="http://schemas.openxmlformats.org/markup-compatibility/2006">
-    <mc:Choice xmlns:p159="http://schemas.microsoft.com/office/powerpoint/2015/09/main" Requires="p159">
+  <mc:AlternateContent xmlns:mc="http://schemas.openxmlformats.org/markup-compatibility/2006" xmlns:p159="http://schemas.microsoft.com/office/powerpoint/2015/09/main">
+    <mc:Choice Requires="p159">
       <p:transition xmlns:p14="http://schemas.microsoft.com/office/powerpoint/2010/main" spd="slow" p14:dur="2000">
         <p159:morph option="byObject"/>
       </p:transition>
     </mc:Choice>
-    <mc:Fallback>
+    <mc:Fallback xmlns="">
       <p:transition spd="slow">
         <p:fade/>
       </p:transition>
@@ -9468,7 +9437,7 @@
               <a:rPr lang="en"/>
               <a:t>8</a:t>
             </a:fld>
-            <a:endParaRPr/>
+            <a:endParaRPr dirty="0"/>
           </a:p>
         </p:txBody>
       </p:sp>
@@ -9514,13 +9483,13 @@
   <p:clrMapOvr>
     <a:masterClrMapping/>
   </p:clrMapOvr>
-  <mc:AlternateContent xmlns:mc="http://schemas.openxmlformats.org/markup-compatibility/2006">
-    <mc:Choice xmlns:p159="http://schemas.microsoft.com/office/powerpoint/2015/09/main" Requires="p159">
+  <mc:AlternateContent xmlns:mc="http://schemas.openxmlformats.org/markup-compatibility/2006" xmlns:p159="http://schemas.microsoft.com/office/powerpoint/2015/09/main">
+    <mc:Choice Requires="p159">
       <p:transition xmlns:p14="http://schemas.microsoft.com/office/powerpoint/2010/main" spd="slow" p14:dur="2000">
         <p159:morph option="byObject"/>
       </p:transition>
     </mc:Choice>
-    <mc:Fallback>
+    <mc:Fallback xmlns="">
       <p:transition spd="slow">
         <p:fade/>
       </p:transition>
@@ -9634,7 +9603,7 @@
               <a:rPr lang="en"/>
               <a:t>9</a:t>
             </a:fld>
-            <a:endParaRPr/>
+            <a:endParaRPr dirty="0"/>
           </a:p>
         </p:txBody>
       </p:sp>

</xml_diff>

<commit_message>
database added and changes in first pages regarding submission dates
</commit_message>
<xml_diff>
--- a/project.pptx
+++ b/project.pptx
@@ -5,7 +5,7 @@
     <p:sldMasterId id="2147483658" r:id="rId1"/>
   </p:sldMasterIdLst>
   <p:notesMasterIdLst>
-    <p:notesMasterId r:id="rId25"/>
+    <p:notesMasterId r:id="rId26"/>
   </p:notesMasterIdLst>
   <p:sldIdLst>
     <p:sldId id="256" r:id="rId2"/>
@@ -20,25 +20,26 @@
     <p:sldId id="295" r:id="rId11"/>
     <p:sldId id="301" r:id="rId12"/>
     <p:sldId id="302" r:id="rId13"/>
-    <p:sldId id="303" r:id="rId14"/>
-    <p:sldId id="304" r:id="rId15"/>
-    <p:sldId id="305" r:id="rId16"/>
-    <p:sldId id="306" r:id="rId17"/>
-    <p:sldId id="307" r:id="rId18"/>
-    <p:sldId id="308" r:id="rId19"/>
-    <p:sldId id="309" r:id="rId20"/>
-    <p:sldId id="310" r:id="rId21"/>
-    <p:sldId id="311" r:id="rId22"/>
-    <p:sldId id="312" r:id="rId23"/>
-    <p:sldId id="313" r:id="rId24"/>
+    <p:sldId id="311" r:id="rId14"/>
+    <p:sldId id="312" r:id="rId15"/>
+    <p:sldId id="303" r:id="rId16"/>
+    <p:sldId id="304" r:id="rId17"/>
+    <p:sldId id="305" r:id="rId18"/>
+    <p:sldId id="306" r:id="rId19"/>
+    <p:sldId id="307" r:id="rId20"/>
+    <p:sldId id="308" r:id="rId21"/>
+    <p:sldId id="309" r:id="rId22"/>
+    <p:sldId id="315" r:id="rId23"/>
+    <p:sldId id="316" r:id="rId24"/>
+    <p:sldId id="313" r:id="rId25"/>
   </p:sldIdLst>
   <p:sldSz cx="9144000" cy="5143500" type="screen16x9"/>
   <p:notesSz cx="6858000" cy="9144000"/>
   <p:embeddedFontLst>
     <p:embeddedFont>
       <p:font typeface="Quicksand" panose="020B0604020202020204" charset="0"/>
-      <p:regular r:id="rId26"/>
-      <p:bold r:id="rId27"/>
+      <p:regular r:id="rId27"/>
+      <p:bold r:id="rId28"/>
     </p:embeddedFont>
   </p:embeddedFontLst>
   <p:defaultTextStyle>
@@ -5041,7 +5042,7 @@
         </p:nvSpPr>
         <p:spPr>
           <a:xfrm>
-            <a:off x="1605516" y="233918"/>
+            <a:off x="1584251" y="304237"/>
             <a:ext cx="5092996" cy="461665"/>
           </a:xfrm>
           <a:prstGeom prst="rect">
@@ -5062,17 +5063,17 @@
                 </a:solidFill>
                 <a:latin typeface="Quicksand" panose="020B0604020202020204" charset="0"/>
               </a:rPr>
-              <a:t>Home Screen</a:t>
+              <a:t>Login </a:t>
             </a:r>
           </a:p>
         </p:txBody>
       </p:sp>
       <p:pic>
         <p:nvPicPr>
-          <p:cNvPr id="10" name="Picture 9">
+          <p:cNvPr id="6" name="Picture 5">
             <a:extLst>
               <a:ext uri="{FF2B5EF4-FFF2-40B4-BE49-F238E27FC236}">
-                <a16:creationId xmlns:a16="http://schemas.microsoft.com/office/drawing/2014/main" id="{9FD62361-E3D0-C9A0-AC5E-28B89BCDFFBE}"/>
+                <a16:creationId xmlns:a16="http://schemas.microsoft.com/office/drawing/2014/main" id="{F5224DBB-587D-33AA-E449-411F52D6FDE3}"/>
               </a:ext>
             </a:extLst>
           </p:cNvPr>
@@ -5083,13 +5084,13 @@
         </p:nvPicPr>
         <p:blipFill rotWithShape="1">
           <a:blip r:embed="rId2"/>
-          <a:srcRect t="12932" b="6540"/>
+          <a:srcRect t="14874" b="5893"/>
           <a:stretch/>
         </p:blipFill>
         <p:spPr>
           <a:xfrm>
-            <a:off x="176695" y="781231"/>
-            <a:ext cx="8770656" cy="3970899"/>
+            <a:off x="228600" y="882437"/>
+            <a:ext cx="8686800" cy="3869694"/>
           </a:xfrm>
           <a:prstGeom prst="rect">
             <a:avLst/>
@@ -5099,7 +5100,7 @@
     </p:spTree>
     <p:extLst>
       <p:ext uri="{BB962C8B-B14F-4D97-AF65-F5344CB8AC3E}">
-        <p14:creationId xmlns:p14="http://schemas.microsoft.com/office/powerpoint/2010/main" val="1975592453"/>
+        <p14:creationId xmlns:p14="http://schemas.microsoft.com/office/powerpoint/2010/main" val="670981542"/>
       </p:ext>
     </p:extLst>
   </p:cSld>
@@ -5199,7 +5200,7 @@
                 </a:solidFill>
                 <a:latin typeface="Quicksand" panose="020B0604020202020204" charset="0"/>
               </a:rPr>
-              <a:t>About Us</a:t>
+              <a:t>Registration </a:t>
             </a:r>
           </a:p>
         </p:txBody>
@@ -5209,7 +5210,7 @@
           <p:cNvPr id="5" name="Picture 4">
             <a:extLst>
               <a:ext uri="{FF2B5EF4-FFF2-40B4-BE49-F238E27FC236}">
-                <a16:creationId xmlns:a16="http://schemas.microsoft.com/office/drawing/2014/main" id="{22AEF317-0204-A162-5F92-0AE0958BB4E4}"/>
+                <a16:creationId xmlns:a16="http://schemas.microsoft.com/office/drawing/2014/main" id="{E955D889-E22F-978B-DB5E-F2A57F3EDE51}"/>
               </a:ext>
             </a:extLst>
           </p:cNvPr>
@@ -5220,13 +5221,13 @@
         </p:nvPicPr>
         <p:blipFill rotWithShape="1">
           <a:blip r:embed="rId2"/>
-          <a:srcRect t="14453" b="5095"/>
+          <a:srcRect t="14874" b="5893"/>
           <a:stretch/>
         </p:blipFill>
         <p:spPr>
           <a:xfrm>
-            <a:off x="191386" y="876336"/>
-            <a:ext cx="8761228" cy="3962927"/>
+            <a:off x="229600" y="935400"/>
+            <a:ext cx="8567907" cy="3816731"/>
           </a:xfrm>
           <a:prstGeom prst="rect">
             <a:avLst/>
@@ -5236,7 +5237,7 @@
     </p:spTree>
     <p:extLst>
       <p:ext uri="{BB962C8B-B14F-4D97-AF65-F5344CB8AC3E}">
-        <p14:creationId xmlns:p14="http://schemas.microsoft.com/office/powerpoint/2010/main" val="2943385507"/>
+        <p14:creationId xmlns:p14="http://schemas.microsoft.com/office/powerpoint/2010/main" val="2497176474"/>
       </p:ext>
     </p:extLst>
   </p:cSld>
@@ -5315,7 +5316,7 @@
         </p:nvSpPr>
         <p:spPr>
           <a:xfrm>
-            <a:off x="1584251" y="304237"/>
+            <a:off x="1605516" y="233918"/>
             <a:ext cx="5092996" cy="461665"/>
           </a:xfrm>
           <a:prstGeom prst="rect">
@@ -5336,17 +5337,17 @@
                 </a:solidFill>
                 <a:latin typeface="Quicksand" panose="020B0604020202020204" charset="0"/>
               </a:rPr>
-              <a:t>Services</a:t>
+              <a:t>Home Screen</a:t>
             </a:r>
           </a:p>
         </p:txBody>
       </p:sp>
       <p:pic>
         <p:nvPicPr>
-          <p:cNvPr id="6" name="Picture 5">
+          <p:cNvPr id="10" name="Picture 9">
             <a:extLst>
               <a:ext uri="{FF2B5EF4-FFF2-40B4-BE49-F238E27FC236}">
-                <a16:creationId xmlns:a16="http://schemas.microsoft.com/office/drawing/2014/main" id="{26C816B0-D68D-307D-A7D4-31998946ABE3}"/>
+                <a16:creationId xmlns:a16="http://schemas.microsoft.com/office/drawing/2014/main" id="{9FD62361-E3D0-C9A0-AC5E-28B89BCDFFBE}"/>
               </a:ext>
             </a:extLst>
           </p:cNvPr>
@@ -5357,13 +5358,13 @@
         </p:nvPicPr>
         <p:blipFill rotWithShape="1">
           <a:blip r:embed="rId2"/>
-          <a:srcRect t="13212" b="5893"/>
+          <a:srcRect t="12932" b="6540"/>
           <a:stretch/>
         </p:blipFill>
         <p:spPr>
           <a:xfrm>
-            <a:off x="196702" y="772275"/>
-            <a:ext cx="8750595" cy="3979856"/>
+            <a:off x="176695" y="781231"/>
+            <a:ext cx="8770656" cy="3970899"/>
           </a:xfrm>
           <a:prstGeom prst="rect">
             <a:avLst/>
@@ -5373,7 +5374,7 @@
     </p:spTree>
     <p:extLst>
       <p:ext uri="{BB962C8B-B14F-4D97-AF65-F5344CB8AC3E}">
-        <p14:creationId xmlns:p14="http://schemas.microsoft.com/office/powerpoint/2010/main" val="3164185743"/>
+        <p14:creationId xmlns:p14="http://schemas.microsoft.com/office/powerpoint/2010/main" val="1975592453"/>
       </p:ext>
     </p:extLst>
   </p:cSld>
@@ -5473,7 +5474,7 @@
                 </a:solidFill>
                 <a:latin typeface="Quicksand" panose="020B0604020202020204" charset="0"/>
               </a:rPr>
-              <a:t>Team</a:t>
+              <a:t>About Us</a:t>
             </a:r>
           </a:p>
         </p:txBody>
@@ -5483,7 +5484,7 @@
           <p:cNvPr id="5" name="Picture 4">
             <a:extLst>
               <a:ext uri="{FF2B5EF4-FFF2-40B4-BE49-F238E27FC236}">
-                <a16:creationId xmlns:a16="http://schemas.microsoft.com/office/drawing/2014/main" id="{F6F4991D-C198-1E6D-08D7-3A04062DD96C}"/>
+                <a16:creationId xmlns:a16="http://schemas.microsoft.com/office/drawing/2014/main" id="{22AEF317-0204-A162-5F92-0AE0958BB4E4}"/>
               </a:ext>
             </a:extLst>
           </p:cNvPr>
@@ -5494,13 +5495,13 @@
         </p:nvPicPr>
         <p:blipFill rotWithShape="1">
           <a:blip r:embed="rId2"/>
-          <a:srcRect t="14874" b="5893"/>
+          <a:srcRect t="14453" b="5095"/>
           <a:stretch/>
         </p:blipFill>
         <p:spPr>
           <a:xfrm>
-            <a:off x="204508" y="948105"/>
-            <a:ext cx="8734983" cy="3891158"/>
+            <a:off x="191386" y="876336"/>
+            <a:ext cx="8761228" cy="3962927"/>
           </a:xfrm>
           <a:prstGeom prst="rect">
             <a:avLst/>
@@ -5510,7 +5511,7 @@
     </p:spTree>
     <p:extLst>
       <p:ext uri="{BB962C8B-B14F-4D97-AF65-F5344CB8AC3E}">
-        <p14:creationId xmlns:p14="http://schemas.microsoft.com/office/powerpoint/2010/main" val="1634292605"/>
+        <p14:creationId xmlns:p14="http://schemas.microsoft.com/office/powerpoint/2010/main" val="2943385507"/>
       </p:ext>
     </p:extLst>
   </p:cSld>
@@ -5610,7 +5611,7 @@
                 </a:solidFill>
                 <a:latin typeface="Quicksand" panose="020B0604020202020204" charset="0"/>
               </a:rPr>
-              <a:t>Shop</a:t>
+              <a:t>Services</a:t>
             </a:r>
           </a:p>
         </p:txBody>
@@ -5620,7 +5621,7 @@
           <p:cNvPr id="6" name="Picture 5">
             <a:extLst>
               <a:ext uri="{FF2B5EF4-FFF2-40B4-BE49-F238E27FC236}">
-                <a16:creationId xmlns:a16="http://schemas.microsoft.com/office/drawing/2014/main" id="{8229C457-1816-B1B2-0EBF-8DF4FBDAF227}"/>
+                <a16:creationId xmlns:a16="http://schemas.microsoft.com/office/drawing/2014/main" id="{26C816B0-D68D-307D-A7D4-31998946ABE3}"/>
               </a:ext>
             </a:extLst>
           </p:cNvPr>
@@ -5631,13 +5632,13 @@
         </p:nvPicPr>
         <p:blipFill rotWithShape="1">
           <a:blip r:embed="rId2"/>
-          <a:srcRect t="14873" b="7588"/>
+          <a:srcRect t="13212" b="5893"/>
           <a:stretch/>
         </p:blipFill>
         <p:spPr>
           <a:xfrm>
-            <a:off x="223283" y="960577"/>
-            <a:ext cx="8697433" cy="3791554"/>
+            <a:off x="196702" y="772275"/>
+            <a:ext cx="8750595" cy="3979856"/>
           </a:xfrm>
           <a:prstGeom prst="rect">
             <a:avLst/>
@@ -5647,7 +5648,7 @@
     </p:spTree>
     <p:extLst>
       <p:ext uri="{BB962C8B-B14F-4D97-AF65-F5344CB8AC3E}">
-        <p14:creationId xmlns:p14="http://schemas.microsoft.com/office/powerpoint/2010/main" val="3235239601"/>
+        <p14:creationId xmlns:p14="http://schemas.microsoft.com/office/powerpoint/2010/main" val="3164185743"/>
       </p:ext>
     </p:extLst>
   </p:cSld>
@@ -5747,7 +5748,7 @@
                 </a:solidFill>
                 <a:latin typeface="Quicksand" panose="020B0604020202020204" charset="0"/>
               </a:rPr>
-              <a:t>Cart</a:t>
+              <a:t>Team</a:t>
             </a:r>
           </a:p>
         </p:txBody>
@@ -5757,7 +5758,7 @@
           <p:cNvPr id="5" name="Picture 4">
             <a:extLst>
               <a:ext uri="{FF2B5EF4-FFF2-40B4-BE49-F238E27FC236}">
-                <a16:creationId xmlns:a16="http://schemas.microsoft.com/office/drawing/2014/main" id="{C1871B41-0EA5-3EEC-B539-2A8A7D22F83A}"/>
+                <a16:creationId xmlns:a16="http://schemas.microsoft.com/office/drawing/2014/main" id="{F6F4991D-C198-1E6D-08D7-3A04062DD96C}"/>
               </a:ext>
             </a:extLst>
           </p:cNvPr>
@@ -5768,13 +5769,13 @@
         </p:nvPicPr>
         <p:blipFill rotWithShape="1">
           <a:blip r:embed="rId2"/>
-          <a:srcRect t="12592" b="5893"/>
+          <a:srcRect t="14874" b="5893"/>
           <a:stretch/>
         </p:blipFill>
         <p:spPr>
           <a:xfrm>
-            <a:off x="187181" y="820157"/>
-            <a:ext cx="8769637" cy="4019106"/>
+            <a:off x="204508" y="948105"/>
+            <a:ext cx="8734983" cy="3891158"/>
           </a:xfrm>
           <a:prstGeom prst="rect">
             <a:avLst/>
@@ -5784,7 +5785,7 @@
     </p:spTree>
     <p:extLst>
       <p:ext uri="{BB962C8B-B14F-4D97-AF65-F5344CB8AC3E}">
-        <p14:creationId xmlns:p14="http://schemas.microsoft.com/office/powerpoint/2010/main" val="4228752764"/>
+        <p14:creationId xmlns:p14="http://schemas.microsoft.com/office/powerpoint/2010/main" val="1634292605"/>
       </p:ext>
     </p:extLst>
   </p:cSld>
@@ -5884,7 +5885,7 @@
                 </a:solidFill>
                 <a:latin typeface="Quicksand" panose="020B0604020202020204" charset="0"/>
               </a:rPr>
-              <a:t>Cart</a:t>
+              <a:t>Shop</a:t>
             </a:r>
           </a:p>
         </p:txBody>
@@ -5894,7 +5895,7 @@
           <p:cNvPr id="6" name="Picture 5">
             <a:extLst>
               <a:ext uri="{FF2B5EF4-FFF2-40B4-BE49-F238E27FC236}">
-                <a16:creationId xmlns:a16="http://schemas.microsoft.com/office/drawing/2014/main" id="{0512B2B8-E01C-E9FF-B69A-1EA6DE418AB5}"/>
+                <a16:creationId xmlns:a16="http://schemas.microsoft.com/office/drawing/2014/main" id="{8229C457-1816-B1B2-0EBF-8DF4FBDAF227}"/>
               </a:ext>
             </a:extLst>
           </p:cNvPr>
@@ -5905,13 +5906,13 @@
         </p:nvPicPr>
         <p:blipFill rotWithShape="1">
           <a:blip r:embed="rId2"/>
-          <a:srcRect t="12798" b="5893"/>
+          <a:srcRect t="14873" b="7588"/>
           <a:stretch/>
         </p:blipFill>
         <p:spPr>
           <a:xfrm>
-            <a:off x="310420" y="855896"/>
-            <a:ext cx="8523157" cy="3896235"/>
+            <a:off x="223283" y="960577"/>
+            <a:ext cx="8697433" cy="3791554"/>
           </a:xfrm>
           <a:prstGeom prst="rect">
             <a:avLst/>
@@ -5921,7 +5922,7 @@
     </p:spTree>
     <p:extLst>
       <p:ext uri="{BB962C8B-B14F-4D97-AF65-F5344CB8AC3E}">
-        <p14:creationId xmlns:p14="http://schemas.microsoft.com/office/powerpoint/2010/main" val="1052714166"/>
+        <p14:creationId xmlns:p14="http://schemas.microsoft.com/office/powerpoint/2010/main" val="3235239601"/>
       </p:ext>
     </p:extLst>
   </p:cSld>
@@ -6496,7 +6497,7 @@
                 </a:solidFill>
                 <a:latin typeface="Quicksand" panose="020B0604020202020204" charset="0"/>
               </a:rPr>
-              <a:t>Payment</a:t>
+              <a:t>Cart</a:t>
             </a:r>
           </a:p>
         </p:txBody>
@@ -6506,7 +6507,7 @@
           <p:cNvPr id="5" name="Picture 4">
             <a:extLst>
               <a:ext uri="{FF2B5EF4-FFF2-40B4-BE49-F238E27FC236}">
-                <a16:creationId xmlns:a16="http://schemas.microsoft.com/office/drawing/2014/main" id="{BA2504B9-2C06-B448-F916-44F726E68B4E}"/>
+                <a16:creationId xmlns:a16="http://schemas.microsoft.com/office/drawing/2014/main" id="{C1871B41-0EA5-3EEC-B539-2A8A7D22F83A}"/>
               </a:ext>
             </a:extLst>
           </p:cNvPr>
@@ -6517,13 +6518,13 @@
         </p:nvPicPr>
         <p:blipFill rotWithShape="1">
           <a:blip r:embed="rId2"/>
-          <a:srcRect t="13212" b="5893"/>
+          <a:srcRect t="12592" b="5893"/>
           <a:stretch/>
         </p:blipFill>
         <p:spPr>
           <a:xfrm>
-            <a:off x="200308" y="862687"/>
-            <a:ext cx="8743384" cy="3976576"/>
+            <a:off x="187181" y="820157"/>
+            <a:ext cx="8769637" cy="4019106"/>
           </a:xfrm>
           <a:prstGeom prst="rect">
             <a:avLst/>
@@ -6533,7 +6534,7 @@
     </p:spTree>
     <p:extLst>
       <p:ext uri="{BB962C8B-B14F-4D97-AF65-F5344CB8AC3E}">
-        <p14:creationId xmlns:p14="http://schemas.microsoft.com/office/powerpoint/2010/main" val="3252067806"/>
+        <p14:creationId xmlns:p14="http://schemas.microsoft.com/office/powerpoint/2010/main" val="4228752764"/>
       </p:ext>
     </p:extLst>
   </p:cSld>
@@ -6633,17 +6634,17 @@
                 </a:solidFill>
                 <a:latin typeface="Quicksand" panose="020B0604020202020204" charset="0"/>
               </a:rPr>
-              <a:t>Login </a:t>
+              <a:t>Calculator</a:t>
             </a:r>
           </a:p>
         </p:txBody>
       </p:sp>
       <p:pic>
         <p:nvPicPr>
-          <p:cNvPr id="6" name="Picture 5">
+          <p:cNvPr id="8" name="Picture 7">
             <a:extLst>
               <a:ext uri="{FF2B5EF4-FFF2-40B4-BE49-F238E27FC236}">
-                <a16:creationId xmlns:a16="http://schemas.microsoft.com/office/drawing/2014/main" id="{F5224DBB-587D-33AA-E449-411F52D6FDE3}"/>
+                <a16:creationId xmlns:a16="http://schemas.microsoft.com/office/drawing/2014/main" id="{9CD1B537-D2BF-9507-3067-E269BD763F7A}"/>
               </a:ext>
             </a:extLst>
           </p:cNvPr>
@@ -6654,13 +6655,13 @@
         </p:nvPicPr>
         <p:blipFill rotWithShape="1">
           <a:blip r:embed="rId2"/>
-          <a:srcRect t="14874" b="5893"/>
+          <a:srcRect t="13005" b="5893"/>
           <a:stretch/>
         </p:blipFill>
         <p:spPr>
           <a:xfrm>
-            <a:off x="228600" y="882437"/>
-            <a:ext cx="8686800" cy="3869694"/>
+            <a:off x="170121" y="974088"/>
+            <a:ext cx="8803758" cy="4014271"/>
           </a:xfrm>
           <a:prstGeom prst="rect">
             <a:avLst/>
@@ -6670,7 +6671,7 @@
     </p:spTree>
     <p:extLst>
       <p:ext uri="{BB962C8B-B14F-4D97-AF65-F5344CB8AC3E}">
-        <p14:creationId xmlns:p14="http://schemas.microsoft.com/office/powerpoint/2010/main" val="670981542"/>
+        <p14:creationId xmlns:p14="http://schemas.microsoft.com/office/powerpoint/2010/main" val="1052714166"/>
       </p:ext>
     </p:extLst>
   </p:cSld>
@@ -6770,7 +6771,7 @@
                 </a:solidFill>
                 <a:latin typeface="Quicksand" panose="020B0604020202020204" charset="0"/>
               </a:rPr>
-              <a:t>Registration </a:t>
+              <a:t>Admin Login Page</a:t>
             </a:r>
           </a:p>
         </p:txBody>
@@ -6780,7 +6781,7 @@
           <p:cNvPr id="5" name="Picture 4">
             <a:extLst>
               <a:ext uri="{FF2B5EF4-FFF2-40B4-BE49-F238E27FC236}">
-                <a16:creationId xmlns:a16="http://schemas.microsoft.com/office/drawing/2014/main" id="{E955D889-E22F-978B-DB5E-F2A57F3EDE51}"/>
+                <a16:creationId xmlns:a16="http://schemas.microsoft.com/office/drawing/2014/main" id="{F6A50CED-3E89-E1F8-AAE3-E60D81C13EA3}"/>
               </a:ext>
             </a:extLst>
           </p:cNvPr>
@@ -6791,13 +6792,13 @@
         </p:nvPicPr>
         <p:blipFill rotWithShape="1">
           <a:blip r:embed="rId2"/>
-          <a:srcRect t="14874" b="5893"/>
+          <a:srcRect t="12382" b="5916"/>
           <a:stretch/>
         </p:blipFill>
         <p:spPr>
           <a:xfrm>
-            <a:off x="229600" y="935400"/>
-            <a:ext cx="8567907" cy="3816731"/>
+            <a:off x="205380" y="897199"/>
+            <a:ext cx="8733240" cy="4012582"/>
           </a:xfrm>
           <a:prstGeom prst="rect">
             <a:avLst/>
@@ -6807,7 +6808,7 @@
     </p:spTree>
     <p:extLst>
       <p:ext uri="{BB962C8B-B14F-4D97-AF65-F5344CB8AC3E}">
-        <p14:creationId xmlns:p14="http://schemas.microsoft.com/office/powerpoint/2010/main" val="2497176474"/>
+        <p14:creationId xmlns:p14="http://schemas.microsoft.com/office/powerpoint/2010/main" val="973152853"/>
       </p:ext>
     </p:extLst>
   </p:cSld>
@@ -6818,6 +6819,114 @@
 </file>
 
 <file path=ppt/slides/slide23.xml><?xml version="1.0" encoding="utf-8"?>
+<p:sld xmlns:a="http://schemas.openxmlformats.org/drawingml/2006/main" xmlns:r="http://schemas.openxmlformats.org/officeDocument/2006/relationships" xmlns:p="http://schemas.openxmlformats.org/presentationml/2006/main">
+  <p:cSld>
+    <p:spTree>
+      <p:nvGrpSpPr>
+        <p:cNvPr id="1" name=""/>
+        <p:cNvGrpSpPr/>
+        <p:nvPr/>
+      </p:nvGrpSpPr>
+      <p:grpSpPr>
+        <a:xfrm>
+          <a:off x="0" y="0"/>
+          <a:ext cx="0" cy="0"/>
+          <a:chOff x="0" y="0"/>
+          <a:chExt cx="0" cy="0"/>
+        </a:xfrm>
+      </p:grpSpPr>
+      <p:sp>
+        <p:nvSpPr>
+          <p:cNvPr id="2" name="Slide Number Placeholder 1">
+            <a:extLst>
+              <a:ext uri="{FF2B5EF4-FFF2-40B4-BE49-F238E27FC236}">
+                <a16:creationId xmlns:a16="http://schemas.microsoft.com/office/drawing/2014/main" id="{A6AB6AFE-0127-E693-F99D-E572E7DD5A9D}"/>
+              </a:ext>
+            </a:extLst>
+          </p:cNvPr>
+          <p:cNvSpPr>
+            <a:spLocks noGrp="1"/>
+          </p:cNvSpPr>
+          <p:nvPr>
+            <p:ph type="sldNum" idx="12"/>
+          </p:nvPr>
+        </p:nvSpPr>
+        <p:spPr/>
+        <p:txBody>
+          <a:bodyPr/>
+          <a:lstStyle/>
+          <a:p>
+            <a:pPr marL="0" lvl="0" indent="0" algn="r" rtl="0">
+              <a:spcBef>
+                <a:spcPts val="0"/>
+              </a:spcBef>
+              <a:spcAft>
+                <a:spcPts val="0"/>
+              </a:spcAft>
+              <a:buNone/>
+            </a:pPr>
+            <a:fld id="{00000000-1234-1234-1234-123412341234}" type="slidenum">
+              <a:rPr lang="en" smtClean="0"/>
+              <a:t>23</a:t>
+            </a:fld>
+            <a:endParaRPr lang="en"/>
+          </a:p>
+        </p:txBody>
+      </p:sp>
+      <p:sp>
+        <p:nvSpPr>
+          <p:cNvPr id="4" name="TextBox 3">
+            <a:extLst>
+              <a:ext uri="{FF2B5EF4-FFF2-40B4-BE49-F238E27FC236}">
+                <a16:creationId xmlns:a16="http://schemas.microsoft.com/office/drawing/2014/main" id="{5FE55C01-2F40-AD59-7F30-E7CA596D5242}"/>
+              </a:ext>
+            </a:extLst>
+          </p:cNvPr>
+          <p:cNvSpPr txBox="1"/>
+          <p:nvPr/>
+        </p:nvSpPr>
+        <p:spPr>
+          <a:xfrm>
+            <a:off x="1584251" y="304237"/>
+            <a:ext cx="5092996" cy="461665"/>
+          </a:xfrm>
+          <a:prstGeom prst="rect">
+            <a:avLst/>
+          </a:prstGeom>
+          <a:noFill/>
+        </p:spPr>
+        <p:txBody>
+          <a:bodyPr wrap="square" rtlCol="0">
+            <a:spAutoFit/>
+          </a:bodyPr>
+          <a:lstStyle/>
+          <a:p>
+            <a:r>
+              <a:rPr lang="en-GB" sz="2400" b="1" dirty="0">
+                <a:solidFill>
+                  <a:schemeClr val="accent1"/>
+                </a:solidFill>
+                <a:latin typeface="Quicksand" panose="020B0604020202020204" charset="0"/>
+              </a:rPr>
+              <a:t>Admin side Dashboard</a:t>
+            </a:r>
+          </a:p>
+        </p:txBody>
+      </p:sp>
+    </p:spTree>
+    <p:extLst>
+      <p:ext uri="{BB962C8B-B14F-4D97-AF65-F5344CB8AC3E}">
+        <p14:creationId xmlns:p14="http://schemas.microsoft.com/office/powerpoint/2010/main" val="3434885754"/>
+      </p:ext>
+    </p:extLst>
+  </p:cSld>
+  <p:clrMapOvr>
+    <a:masterClrMapping/>
+  </p:clrMapOvr>
+</p:sld>
+</file>
+
+<file path=ppt/slides/slide24.xml><?xml version="1.0" encoding="utf-8"?>
 <p:sld xmlns:a="http://schemas.openxmlformats.org/drawingml/2006/main" xmlns:r="http://schemas.openxmlformats.org/officeDocument/2006/relationships" xmlns:p="http://schemas.openxmlformats.org/presentationml/2006/main">
   <p:cSld>
     <p:spTree>
@@ -6866,7 +6975,7 @@
             </a:pPr>
             <a:fld id="{00000000-1234-1234-1234-123412341234}" type="slidenum">
               <a:rPr lang="en" smtClean="0"/>
-              <a:t>23</a:t>
+              <a:t>24</a:t>
             </a:fld>
             <a:endParaRPr lang="en"/>
           </a:p>
@@ -9084,13 +9193,13 @@
   <p:clrMapOvr>
     <a:masterClrMapping/>
   </p:clrMapOvr>
-  <mc:AlternateContent xmlns:mc="http://schemas.openxmlformats.org/markup-compatibility/2006">
-    <mc:Choice xmlns:p159="http://schemas.microsoft.com/office/powerpoint/2015/09/main" Requires="p159">
+  <mc:AlternateContent xmlns:mc="http://schemas.openxmlformats.org/markup-compatibility/2006" xmlns:p159="http://schemas.microsoft.com/office/powerpoint/2015/09/main">
+    <mc:Choice Requires="p159">
       <p:transition xmlns:p14="http://schemas.microsoft.com/office/powerpoint/2010/main" spd="slow" p14:dur="2000">
         <p159:morph option="byObject"/>
       </p:transition>
     </mc:Choice>
-    <mc:Fallback>
+    <mc:Fallback xmlns="">
       <p:transition spd="slow">
         <p:fade/>
       </p:transition>

</xml_diff>